<commit_message>
include link to key
</commit_message>
<xml_diff>
--- a/03-speedreading-with-llms/ppt/speedreading-with-llms.pptx
+++ b/03-speedreading-with-llms/ppt/speedreading-with-llms.pptx
@@ -266,7 +266,7 @@
           <a:p>
             <a:fld id="{412A36AD-C140-47B5-A0AA-2808AF1C1C9D}" type="datetimeFigureOut">
               <a:rPr lang="en-AU" smtClean="0"/>
-              <a:t>13/11/2023</a:t>
+              <a:t>28/11/2023</a:t>
             </a:fld>
             <a:endParaRPr lang="en-AU"/>
           </a:p>
@@ -431,7 +431,7 @@
           <a:p>
             <a:fld id="{2763829E-EB69-4A98-9D54-8D6822520B27}" type="datetimeFigureOut">
               <a:rPr lang="en-AU" smtClean="0"/>
-              <a:t>13/11/2023</a:t>
+              <a:t>28/11/2023</a:t>
             </a:fld>
             <a:endParaRPr lang="en-AU"/>
           </a:p>
@@ -13098,8 +13098,15 @@
             <a:pPr marL="914400" lvl="1" indent="-457200"/>
             <a:r>
               <a:rPr lang="en-US" sz="1400" dirty="0"/>
-              <a:t>For today’s session, you can use the provided key (courtesy of Dartmouth College Library)</a:t>
-            </a:r>
+              <a:t>For today’s session, you can use the provided key (courtesy of Dartmouth College Library): </a:t>
+            </a:r>
+            <a:r>
+              <a:rPr lang="en-US" sz="1400" dirty="0">
+                <a:hlinkClick r:id="rId2"/>
+              </a:rPr>
+              <a:t>www.dartgo.org/cta-openai</a:t>
+            </a:r>
+            <a:endParaRPr lang="en-US" sz="1400" dirty="0"/>
           </a:p>
           <a:p>
             <a:pPr marL="457200" indent="-457200"/>

</xml_diff>